<commit_message>
Update: NEVER OVERWRITE ORIGINAL DATA!
</commit_message>
<xml_diff>
--- a/session-4-wrds/Session 4 -  Intro to WRDS.pptx
+++ b/session-4-wrds/Session 4 -  Intro to WRDS.pptx
@@ -855,330 +855,6 @@
     </pc:docChg>
   </pc:docChgLst>
   <pc:docChgLst>
-    <pc:chgData name="Irving Birkner" userId="3ca2f16b-06b2-436b-9a83-674815ebc501" providerId="ADAL" clId="{1814AE70-A00B-41A8-95BC-13975D88D3B5}"/>
-    <pc:docChg chg="undo custSel addSld delSld modSld sldOrd">
-      <pc:chgData name="Irving Birkner" userId="3ca2f16b-06b2-436b-9a83-674815ebc501" providerId="ADAL" clId="{1814AE70-A00B-41A8-95BC-13975D88D3B5}" dt="2023-07-13T22:22:17.775" v="1648"/>
-      <pc:docMkLst>
-        <pc:docMk/>
-      </pc:docMkLst>
-      <pc:sldChg chg="modNotesTx">
-        <pc:chgData name="Irving Birkner" userId="3ca2f16b-06b2-436b-9a83-674815ebc501" providerId="ADAL" clId="{1814AE70-A00B-41A8-95BC-13975D88D3B5}" dt="2023-07-13T19:21:23.437" v="15"/>
-        <pc:sldMkLst>
-          <pc:docMk/>
-          <pc:sldMk cId="0" sldId="280"/>
-        </pc:sldMkLst>
-      </pc:sldChg>
-      <pc:sldChg chg="ord">
-        <pc:chgData name="Irving Birkner" userId="3ca2f16b-06b2-436b-9a83-674815ebc501" providerId="ADAL" clId="{1814AE70-A00B-41A8-95BC-13975D88D3B5}" dt="2023-07-13T22:22:17.775" v="1648"/>
-        <pc:sldMkLst>
-          <pc:docMk/>
-          <pc:sldMk cId="3056279571" sldId="286"/>
-        </pc:sldMkLst>
-      </pc:sldChg>
-      <pc:sldChg chg="del">
-        <pc:chgData name="Irving Birkner" userId="3ca2f16b-06b2-436b-9a83-674815ebc501" providerId="ADAL" clId="{1814AE70-A00B-41A8-95BC-13975D88D3B5}" dt="2023-07-13T22:10:37.815" v="1380" actId="47"/>
-        <pc:sldMkLst>
-          <pc:docMk/>
-          <pc:sldMk cId="1241510339" sldId="294"/>
-        </pc:sldMkLst>
-      </pc:sldChg>
-      <pc:sldChg chg="del">
-        <pc:chgData name="Irving Birkner" userId="3ca2f16b-06b2-436b-9a83-674815ebc501" providerId="ADAL" clId="{1814AE70-A00B-41A8-95BC-13975D88D3B5}" dt="2023-07-13T22:10:37.815" v="1380" actId="47"/>
-        <pc:sldMkLst>
-          <pc:docMk/>
-          <pc:sldMk cId="1143920132" sldId="315"/>
-        </pc:sldMkLst>
-      </pc:sldChg>
-      <pc:sldChg chg="del">
-        <pc:chgData name="Irving Birkner" userId="3ca2f16b-06b2-436b-9a83-674815ebc501" providerId="ADAL" clId="{1814AE70-A00B-41A8-95BC-13975D88D3B5}" dt="2023-07-13T22:10:37.815" v="1380" actId="47"/>
-        <pc:sldMkLst>
-          <pc:docMk/>
-          <pc:sldMk cId="878560857" sldId="316"/>
-        </pc:sldMkLst>
-      </pc:sldChg>
-      <pc:sldChg chg="del">
-        <pc:chgData name="Irving Birkner" userId="3ca2f16b-06b2-436b-9a83-674815ebc501" providerId="ADAL" clId="{1814AE70-A00B-41A8-95BC-13975D88D3B5}" dt="2023-07-13T22:10:37.815" v="1380" actId="47"/>
-        <pc:sldMkLst>
-          <pc:docMk/>
-          <pc:sldMk cId="2703774932" sldId="317"/>
-        </pc:sldMkLst>
-      </pc:sldChg>
-      <pc:sldChg chg="del">
-        <pc:chgData name="Irving Birkner" userId="3ca2f16b-06b2-436b-9a83-674815ebc501" providerId="ADAL" clId="{1814AE70-A00B-41A8-95BC-13975D88D3B5}" dt="2023-07-13T22:10:37.815" v="1380" actId="47"/>
-        <pc:sldMkLst>
-          <pc:docMk/>
-          <pc:sldMk cId="2588587648" sldId="318"/>
-        </pc:sldMkLst>
-      </pc:sldChg>
-      <pc:sldChg chg="del">
-        <pc:chgData name="Irving Birkner" userId="3ca2f16b-06b2-436b-9a83-674815ebc501" providerId="ADAL" clId="{1814AE70-A00B-41A8-95BC-13975D88D3B5}" dt="2023-07-13T22:10:37.815" v="1380" actId="47"/>
-        <pc:sldMkLst>
-          <pc:docMk/>
-          <pc:sldMk cId="532770432" sldId="319"/>
-        </pc:sldMkLst>
-      </pc:sldChg>
-      <pc:sldChg chg="del">
-        <pc:chgData name="Irving Birkner" userId="3ca2f16b-06b2-436b-9a83-674815ebc501" providerId="ADAL" clId="{1814AE70-A00B-41A8-95BC-13975D88D3B5}" dt="2023-07-13T22:10:37.815" v="1380" actId="47"/>
-        <pc:sldMkLst>
-          <pc:docMk/>
-          <pc:sldMk cId="2563544280" sldId="320"/>
-        </pc:sldMkLst>
-      </pc:sldChg>
-      <pc:sldChg chg="del">
-        <pc:chgData name="Irving Birkner" userId="3ca2f16b-06b2-436b-9a83-674815ebc501" providerId="ADAL" clId="{1814AE70-A00B-41A8-95BC-13975D88D3B5}" dt="2023-07-13T22:10:37.815" v="1380" actId="47"/>
-        <pc:sldMkLst>
-          <pc:docMk/>
-          <pc:sldMk cId="2986560975" sldId="321"/>
-        </pc:sldMkLst>
-      </pc:sldChg>
-      <pc:sldChg chg="del">
-        <pc:chgData name="Irving Birkner" userId="3ca2f16b-06b2-436b-9a83-674815ebc501" providerId="ADAL" clId="{1814AE70-A00B-41A8-95BC-13975D88D3B5}" dt="2023-07-13T22:10:37.815" v="1380" actId="47"/>
-        <pc:sldMkLst>
-          <pc:docMk/>
-          <pc:sldMk cId="4046613230" sldId="322"/>
-        </pc:sldMkLst>
-      </pc:sldChg>
-      <pc:sldChg chg="del">
-        <pc:chgData name="Irving Birkner" userId="3ca2f16b-06b2-436b-9a83-674815ebc501" providerId="ADAL" clId="{1814AE70-A00B-41A8-95BC-13975D88D3B5}" dt="2023-07-13T22:10:37.815" v="1380" actId="47"/>
-        <pc:sldMkLst>
-          <pc:docMk/>
-          <pc:sldMk cId="1587014248" sldId="325"/>
-        </pc:sldMkLst>
-      </pc:sldChg>
-      <pc:sldChg chg="ord">
-        <pc:chgData name="Irving Birkner" userId="3ca2f16b-06b2-436b-9a83-674815ebc501" providerId="ADAL" clId="{1814AE70-A00B-41A8-95BC-13975D88D3B5}" dt="2023-07-13T22:10:24.370" v="1379"/>
-        <pc:sldMkLst>
-          <pc:docMk/>
-          <pc:sldMk cId="544058657" sldId="338"/>
-        </pc:sldMkLst>
-      </pc:sldChg>
-      <pc:sldChg chg="del">
-        <pc:chgData name="Irving Birkner" userId="3ca2f16b-06b2-436b-9a83-674815ebc501" providerId="ADAL" clId="{1814AE70-A00B-41A8-95BC-13975D88D3B5}" dt="2023-07-13T22:21:12.681" v="1613" actId="47"/>
-        <pc:sldMkLst>
-          <pc:docMk/>
-          <pc:sldMk cId="3210127551" sldId="339"/>
-        </pc:sldMkLst>
-      </pc:sldChg>
-      <pc:sldChg chg="del">
-        <pc:chgData name="Irving Birkner" userId="3ca2f16b-06b2-436b-9a83-674815ebc501" providerId="ADAL" clId="{1814AE70-A00B-41A8-95BC-13975D88D3B5}" dt="2023-07-13T19:17:04.109" v="0" actId="2696"/>
-        <pc:sldMkLst>
-          <pc:docMk/>
-          <pc:sldMk cId="1668184574" sldId="341"/>
-        </pc:sldMkLst>
-      </pc:sldChg>
-      <pc:sldChg chg="addSp delSp modSp mod modNotesTx">
-        <pc:chgData name="Irving Birkner" userId="3ca2f16b-06b2-436b-9a83-674815ebc501" providerId="ADAL" clId="{1814AE70-A00B-41A8-95BC-13975D88D3B5}" dt="2023-07-13T20:00:46.161" v="823"/>
-        <pc:sldMkLst>
-          <pc:docMk/>
-          <pc:sldMk cId="382021659" sldId="342"/>
-        </pc:sldMkLst>
-        <pc:picChg chg="del">
-          <ac:chgData name="Irving Birkner" userId="3ca2f16b-06b2-436b-9a83-674815ebc501" providerId="ADAL" clId="{1814AE70-A00B-41A8-95BC-13975D88D3B5}" dt="2023-07-13T19:44:02.149" v="20" actId="478"/>
-          <ac:picMkLst>
-            <pc:docMk/>
-            <pc:sldMk cId="382021659" sldId="342"/>
-            <ac:picMk id="3" creationId="{49FA1C50-EA49-A5AC-0523-5FD7CE5E68AF}"/>
-          </ac:picMkLst>
-        </pc:picChg>
-        <pc:picChg chg="add mod modCrop">
-          <ac:chgData name="Irving Birkner" userId="3ca2f16b-06b2-436b-9a83-674815ebc501" providerId="ADAL" clId="{1814AE70-A00B-41A8-95BC-13975D88D3B5}" dt="2023-07-13T19:54:13.346" v="688" actId="732"/>
-          <ac:picMkLst>
-            <pc:docMk/>
-            <pc:sldMk cId="382021659" sldId="342"/>
-            <ac:picMk id="4" creationId="{DD75B20D-BA3E-4A1B-BEA5-E96460BBEF97}"/>
-          </ac:picMkLst>
-        </pc:picChg>
-      </pc:sldChg>
-      <pc:sldChg chg="del">
-        <pc:chgData name="Irving Birkner" userId="3ca2f16b-06b2-436b-9a83-674815ebc501" providerId="ADAL" clId="{1814AE70-A00B-41A8-95BC-13975D88D3B5}" dt="2023-07-13T19:23:08.809" v="19" actId="2696"/>
-        <pc:sldMkLst>
-          <pc:docMk/>
-          <pc:sldMk cId="2954882178" sldId="344"/>
-        </pc:sldMkLst>
-      </pc:sldChg>
-      <pc:sldChg chg="ord modNotesTx">
-        <pc:chgData name="Irving Birkner" userId="3ca2f16b-06b2-436b-9a83-674815ebc501" providerId="ADAL" clId="{1814AE70-A00B-41A8-95BC-13975D88D3B5}" dt="2023-07-13T22:09:53.482" v="1377" actId="20577"/>
-        <pc:sldMkLst>
-          <pc:docMk/>
-          <pc:sldMk cId="2681098044" sldId="345"/>
-        </pc:sldMkLst>
-      </pc:sldChg>
-      <pc:sldChg chg="del">
-        <pc:chgData name="Irving Birkner" userId="3ca2f16b-06b2-436b-9a83-674815ebc501" providerId="ADAL" clId="{1814AE70-A00B-41A8-95BC-13975D88D3B5}" dt="2023-07-13T20:29:43.102" v="1105" actId="47"/>
-        <pc:sldMkLst>
-          <pc:docMk/>
-          <pc:sldMk cId="1631487348" sldId="346"/>
-        </pc:sldMkLst>
-      </pc:sldChg>
-      <pc:sldChg chg="addSp delSp modSp mod modNotesTx">
-        <pc:chgData name="Irving Birkner" userId="3ca2f16b-06b2-436b-9a83-674815ebc501" providerId="ADAL" clId="{1814AE70-A00B-41A8-95BC-13975D88D3B5}" dt="2023-07-13T20:29:15.979" v="1100" actId="20577"/>
-        <pc:sldMkLst>
-          <pc:docMk/>
-          <pc:sldMk cId="1790047042" sldId="347"/>
-        </pc:sldMkLst>
-        <pc:spChg chg="del mod">
-          <ac:chgData name="Irving Birkner" userId="3ca2f16b-06b2-436b-9a83-674815ebc501" providerId="ADAL" clId="{1814AE70-A00B-41A8-95BC-13975D88D3B5}" dt="2023-07-13T20:27:33.648" v="1009" actId="478"/>
-          <ac:spMkLst>
-            <pc:docMk/>
-            <pc:sldMk cId="1790047042" sldId="347"/>
-            <ac:spMk id="6" creationId="{232CB0DA-7365-F64F-29A1-FBDD839E7C80}"/>
-          </ac:spMkLst>
-        </pc:spChg>
-        <pc:spChg chg="mod">
-          <ac:chgData name="Irving Birkner" userId="3ca2f16b-06b2-436b-9a83-674815ebc501" providerId="ADAL" clId="{1814AE70-A00B-41A8-95BC-13975D88D3B5}" dt="2023-07-13T20:21:07.945" v="863" actId="20577"/>
-          <ac:spMkLst>
-            <pc:docMk/>
-            <pc:sldMk cId="1790047042" sldId="347"/>
-            <ac:spMk id="287" creationId="{00000000-0000-0000-0000-000000000000}"/>
-          </ac:spMkLst>
-        </pc:spChg>
-        <pc:graphicFrameChg chg="add mod modGraphic">
-          <ac:chgData name="Irving Birkner" userId="3ca2f16b-06b2-436b-9a83-674815ebc501" providerId="ADAL" clId="{1814AE70-A00B-41A8-95BC-13975D88D3B5}" dt="2023-07-13T20:27:20.934" v="1008" actId="20577"/>
-          <ac:graphicFrameMkLst>
-            <pc:docMk/>
-            <pc:sldMk cId="1790047042" sldId="347"/>
-            <ac:graphicFrameMk id="2" creationId="{782AFF68-1FA7-5A8B-52B1-8C6606C55CFF}"/>
-          </ac:graphicFrameMkLst>
-        </pc:graphicFrameChg>
-        <pc:picChg chg="del">
-          <ac:chgData name="Irving Birkner" userId="3ca2f16b-06b2-436b-9a83-674815ebc501" providerId="ADAL" clId="{1814AE70-A00B-41A8-95BC-13975D88D3B5}" dt="2023-07-13T20:21:17.546" v="864" actId="478"/>
-          <ac:picMkLst>
-            <pc:docMk/>
-            <pc:sldMk cId="1790047042" sldId="347"/>
-            <ac:picMk id="4" creationId="{89B7216F-C179-BD91-9676-D460174EF296}"/>
-          </ac:picMkLst>
-        </pc:picChg>
-      </pc:sldChg>
-      <pc:sldChg chg="del">
-        <pc:chgData name="Irving Birkner" userId="3ca2f16b-06b2-436b-9a83-674815ebc501" providerId="ADAL" clId="{1814AE70-A00B-41A8-95BC-13975D88D3B5}" dt="2023-07-13T20:29:43.102" v="1105" actId="47"/>
-        <pc:sldMkLst>
-          <pc:docMk/>
-          <pc:sldMk cId="4059683777" sldId="348"/>
-        </pc:sldMkLst>
-      </pc:sldChg>
-      <pc:sldChg chg="del">
-        <pc:chgData name="Irving Birkner" userId="3ca2f16b-06b2-436b-9a83-674815ebc501" providerId="ADAL" clId="{1814AE70-A00B-41A8-95BC-13975D88D3B5}" dt="2023-07-13T20:28:49.494" v="1099" actId="47"/>
-        <pc:sldMkLst>
-          <pc:docMk/>
-          <pc:sldMk cId="1606485367" sldId="349"/>
-        </pc:sldMkLst>
-      </pc:sldChg>
-      <pc:sldChg chg="del">
-        <pc:chgData name="Irving Birkner" userId="3ca2f16b-06b2-436b-9a83-674815ebc501" providerId="ADAL" clId="{1814AE70-A00B-41A8-95BC-13975D88D3B5}" dt="2023-07-13T20:28:49.494" v="1099" actId="47"/>
-        <pc:sldMkLst>
-          <pc:docMk/>
-          <pc:sldMk cId="1165116582" sldId="352"/>
-        </pc:sldMkLst>
-      </pc:sldChg>
-      <pc:sldChg chg="del">
-        <pc:chgData name="Irving Birkner" userId="3ca2f16b-06b2-436b-9a83-674815ebc501" providerId="ADAL" clId="{1814AE70-A00B-41A8-95BC-13975D88D3B5}" dt="2023-07-13T20:28:49.494" v="1099" actId="47"/>
-        <pc:sldMkLst>
-          <pc:docMk/>
-          <pc:sldMk cId="987929229" sldId="353"/>
-        </pc:sldMkLst>
-      </pc:sldChg>
-      <pc:sldChg chg="addSp delSp modSp add mod ord modNotesTx">
-        <pc:chgData name="Irving Birkner" userId="3ca2f16b-06b2-436b-9a83-674815ebc501" providerId="ADAL" clId="{1814AE70-A00B-41A8-95BC-13975D88D3B5}" dt="2023-07-13T22:09:42.229" v="1376" actId="20577"/>
-        <pc:sldMkLst>
-          <pc:docMk/>
-          <pc:sldMk cId="1060599179" sldId="357"/>
-        </pc:sldMkLst>
-        <pc:spChg chg="del mod">
-          <ac:chgData name="Irving Birkner" userId="3ca2f16b-06b2-436b-9a83-674815ebc501" providerId="ADAL" clId="{1814AE70-A00B-41A8-95BC-13975D88D3B5}" dt="2023-07-13T19:20:04.782" v="9" actId="478"/>
-          <ac:spMkLst>
-            <pc:docMk/>
-            <pc:sldMk cId="1060599179" sldId="357"/>
-            <ac:spMk id="3" creationId="{EC9AA3F7-FC6E-575A-F3F6-82A49486401E}"/>
-          </ac:spMkLst>
-        </pc:spChg>
-        <pc:spChg chg="add mod">
-          <ac:chgData name="Irving Birkner" userId="3ca2f16b-06b2-436b-9a83-674815ebc501" providerId="ADAL" clId="{1814AE70-A00B-41A8-95BC-13975D88D3B5}" dt="2023-07-13T19:20:04.782" v="9" actId="478"/>
-          <ac:spMkLst>
-            <pc:docMk/>
-            <pc:sldMk cId="1060599179" sldId="357"/>
-            <ac:spMk id="5" creationId="{D2AAA14F-44ED-838C-2D97-D0CBC8A1FD1B}"/>
-          </ac:spMkLst>
-        </pc:spChg>
-        <pc:spChg chg="add mod">
-          <ac:chgData name="Irving Birkner" userId="3ca2f16b-06b2-436b-9a83-674815ebc501" providerId="ADAL" clId="{1814AE70-A00B-41A8-95BC-13975D88D3B5}" dt="2023-07-13T19:20:29.160" v="11" actId="207"/>
-          <ac:spMkLst>
-            <pc:docMk/>
-            <pc:sldMk cId="1060599179" sldId="357"/>
-            <ac:spMk id="6" creationId="{9CE132C3-49EA-2E47-A337-01679FF02C30}"/>
-          </ac:spMkLst>
-        </pc:spChg>
-      </pc:sldChg>
-      <pc:sldChg chg="add">
-        <pc:chgData name="Irving Birkner" userId="3ca2f16b-06b2-436b-9a83-674815ebc501" providerId="ADAL" clId="{1814AE70-A00B-41A8-95BC-13975D88D3B5}" dt="2023-07-13T20:01:50.641" v="824" actId="2890"/>
-        <pc:sldMkLst>
-          <pc:docMk/>
-          <pc:sldMk cId="1174394797" sldId="358"/>
-        </pc:sldMkLst>
-      </pc:sldChg>
-      <pc:sldChg chg="delSp modSp add mod ord modNotesTx">
-        <pc:chgData name="Irving Birkner" userId="3ca2f16b-06b2-436b-9a83-674815ebc501" providerId="ADAL" clId="{1814AE70-A00B-41A8-95BC-13975D88D3B5}" dt="2023-07-13T22:21:07.242" v="1612" actId="20577"/>
-        <pc:sldMkLst>
-          <pc:docMk/>
-          <pc:sldMk cId="2639607011" sldId="360"/>
-        </pc:sldMkLst>
-        <pc:spChg chg="mod">
-          <ac:chgData name="Irving Birkner" userId="3ca2f16b-06b2-436b-9a83-674815ebc501" providerId="ADAL" clId="{1814AE70-A00B-41A8-95BC-13975D88D3B5}" dt="2023-07-13T22:20:31.196" v="1590" actId="20577"/>
-          <ac:spMkLst>
-            <pc:docMk/>
-            <pc:sldMk cId="2639607011" sldId="360"/>
-            <ac:spMk id="2" creationId="{D8FE4A10-593E-C3E4-8568-22199311CB20}"/>
-          </ac:spMkLst>
-        </pc:spChg>
-        <pc:spChg chg="mod">
-          <ac:chgData name="Irving Birkner" userId="3ca2f16b-06b2-436b-9a83-674815ebc501" providerId="ADAL" clId="{1814AE70-A00B-41A8-95BC-13975D88D3B5}" dt="2023-07-13T22:21:07.242" v="1612" actId="20577"/>
-          <ac:spMkLst>
-            <pc:docMk/>
-            <pc:sldMk cId="2639607011" sldId="360"/>
-            <ac:spMk id="287" creationId="{00000000-0000-0000-0000-000000000000}"/>
-          </ac:spMkLst>
-        </pc:spChg>
-        <pc:picChg chg="del">
-          <ac:chgData name="Irving Birkner" userId="3ca2f16b-06b2-436b-9a83-674815ebc501" providerId="ADAL" clId="{1814AE70-A00B-41A8-95BC-13975D88D3B5}" dt="2023-07-13T22:18:38.452" v="1426" actId="478"/>
-          <ac:picMkLst>
-            <pc:docMk/>
-            <pc:sldMk cId="2639607011" sldId="360"/>
-            <ac:picMk id="4" creationId="{1C7F3501-D10D-4365-EAEF-B4BC43E9468E}"/>
-          </ac:picMkLst>
-        </pc:picChg>
-      </pc:sldChg>
-      <pc:sldChg chg="modSp add mod ord">
-        <pc:chgData name="Irving Birkner" userId="3ca2f16b-06b2-436b-9a83-674815ebc501" providerId="ADAL" clId="{1814AE70-A00B-41A8-95BC-13975D88D3B5}" dt="2023-07-13T22:21:44.344" v="1646" actId="20577"/>
-        <pc:sldMkLst>
-          <pc:docMk/>
-          <pc:sldMk cId="3338026029" sldId="362"/>
-        </pc:sldMkLst>
-        <pc:spChg chg="mod">
-          <ac:chgData name="Irving Birkner" userId="3ca2f16b-06b2-436b-9a83-674815ebc501" providerId="ADAL" clId="{1814AE70-A00B-41A8-95BC-13975D88D3B5}" dt="2023-07-13T22:21:44.344" v="1646" actId="20577"/>
-          <ac:spMkLst>
-            <pc:docMk/>
-            <pc:sldMk cId="3338026029" sldId="362"/>
-            <ac:spMk id="3" creationId="{EC9AA3F7-FC6E-575A-F3F6-82A49486401E}"/>
-          </ac:spMkLst>
-        </pc:spChg>
-      </pc:sldChg>
-      <pc:sldMasterChg chg="delSldLayout">
-        <pc:chgData name="Irving Birkner" userId="3ca2f16b-06b2-436b-9a83-674815ebc501" providerId="ADAL" clId="{1814AE70-A00B-41A8-95BC-13975D88D3B5}" dt="2023-07-13T22:10:37.815" v="1380" actId="47"/>
-        <pc:sldMasterMkLst>
-          <pc:docMk/>
-          <pc:sldMasterMk cId="3033157277" sldId="2147483687"/>
-        </pc:sldMasterMkLst>
-        <pc:sldLayoutChg chg="del">
-          <pc:chgData name="Irving Birkner" userId="3ca2f16b-06b2-436b-9a83-674815ebc501" providerId="ADAL" clId="{1814AE70-A00B-41A8-95BC-13975D88D3B5}" dt="2023-07-13T22:10:37.815" v="1380" actId="47"/>
-          <pc:sldLayoutMkLst>
-            <pc:docMk/>
-            <pc:sldMasterMk cId="3033157277" sldId="2147483687"/>
-            <pc:sldLayoutMk cId="2391683861" sldId="2147483699"/>
-          </pc:sldLayoutMkLst>
-        </pc:sldLayoutChg>
-      </pc:sldMasterChg>
-    </pc:docChg>
-  </pc:docChgLst>
-  <pc:docChgLst>
     <pc:chgData name="John Patrick Johnson" userId="S::jpj8711@ads.northwestern.edu::fe18dc51-e5c5-41f0-a67f-64543119935e" providerId="AD" clId="Web-{FDE0DBAA-E0EB-01D0-0000-2EE440C5DC3B}"/>
     <pc:docChg chg="addSld delSld modSld sldOrd">
       <pc:chgData name="John Patrick Johnson" userId="S::jpj8711@ads.northwestern.edu::fe18dc51-e5c5-41f0-a67f-64543119935e" providerId="AD" clId="Web-{FDE0DBAA-E0EB-01D0-0000-2EE440C5DC3B}" dt="2023-07-14T02:57:47.162" v="1117" actId="20577"/>
@@ -1567,6 +1243,330 @@
           </ac:spMkLst>
         </pc:spChg>
       </pc:sldChg>
+    </pc:docChg>
+  </pc:docChgLst>
+  <pc:docChgLst>
+    <pc:chgData name="Irving Birkner" userId="3ca2f16b-06b2-436b-9a83-674815ebc501" providerId="ADAL" clId="{1814AE70-A00B-41A8-95BC-13975D88D3B5}"/>
+    <pc:docChg chg="undo custSel addSld delSld modSld sldOrd">
+      <pc:chgData name="Irving Birkner" userId="3ca2f16b-06b2-436b-9a83-674815ebc501" providerId="ADAL" clId="{1814AE70-A00B-41A8-95BC-13975D88D3B5}" dt="2023-07-13T22:22:17.775" v="1648"/>
+      <pc:docMkLst>
+        <pc:docMk/>
+      </pc:docMkLst>
+      <pc:sldChg chg="modNotesTx">
+        <pc:chgData name="Irving Birkner" userId="3ca2f16b-06b2-436b-9a83-674815ebc501" providerId="ADAL" clId="{1814AE70-A00B-41A8-95BC-13975D88D3B5}" dt="2023-07-13T19:21:23.437" v="15"/>
+        <pc:sldMkLst>
+          <pc:docMk/>
+          <pc:sldMk cId="0" sldId="280"/>
+        </pc:sldMkLst>
+      </pc:sldChg>
+      <pc:sldChg chg="ord">
+        <pc:chgData name="Irving Birkner" userId="3ca2f16b-06b2-436b-9a83-674815ebc501" providerId="ADAL" clId="{1814AE70-A00B-41A8-95BC-13975D88D3B5}" dt="2023-07-13T22:22:17.775" v="1648"/>
+        <pc:sldMkLst>
+          <pc:docMk/>
+          <pc:sldMk cId="3056279571" sldId="286"/>
+        </pc:sldMkLst>
+      </pc:sldChg>
+      <pc:sldChg chg="del">
+        <pc:chgData name="Irving Birkner" userId="3ca2f16b-06b2-436b-9a83-674815ebc501" providerId="ADAL" clId="{1814AE70-A00B-41A8-95BC-13975D88D3B5}" dt="2023-07-13T22:10:37.815" v="1380" actId="47"/>
+        <pc:sldMkLst>
+          <pc:docMk/>
+          <pc:sldMk cId="1241510339" sldId="294"/>
+        </pc:sldMkLst>
+      </pc:sldChg>
+      <pc:sldChg chg="del">
+        <pc:chgData name="Irving Birkner" userId="3ca2f16b-06b2-436b-9a83-674815ebc501" providerId="ADAL" clId="{1814AE70-A00B-41A8-95BC-13975D88D3B5}" dt="2023-07-13T22:10:37.815" v="1380" actId="47"/>
+        <pc:sldMkLst>
+          <pc:docMk/>
+          <pc:sldMk cId="1143920132" sldId="315"/>
+        </pc:sldMkLst>
+      </pc:sldChg>
+      <pc:sldChg chg="del">
+        <pc:chgData name="Irving Birkner" userId="3ca2f16b-06b2-436b-9a83-674815ebc501" providerId="ADAL" clId="{1814AE70-A00B-41A8-95BC-13975D88D3B5}" dt="2023-07-13T22:10:37.815" v="1380" actId="47"/>
+        <pc:sldMkLst>
+          <pc:docMk/>
+          <pc:sldMk cId="878560857" sldId="316"/>
+        </pc:sldMkLst>
+      </pc:sldChg>
+      <pc:sldChg chg="del">
+        <pc:chgData name="Irving Birkner" userId="3ca2f16b-06b2-436b-9a83-674815ebc501" providerId="ADAL" clId="{1814AE70-A00B-41A8-95BC-13975D88D3B5}" dt="2023-07-13T22:10:37.815" v="1380" actId="47"/>
+        <pc:sldMkLst>
+          <pc:docMk/>
+          <pc:sldMk cId="2703774932" sldId="317"/>
+        </pc:sldMkLst>
+      </pc:sldChg>
+      <pc:sldChg chg="del">
+        <pc:chgData name="Irving Birkner" userId="3ca2f16b-06b2-436b-9a83-674815ebc501" providerId="ADAL" clId="{1814AE70-A00B-41A8-95BC-13975D88D3B5}" dt="2023-07-13T22:10:37.815" v="1380" actId="47"/>
+        <pc:sldMkLst>
+          <pc:docMk/>
+          <pc:sldMk cId="2588587648" sldId="318"/>
+        </pc:sldMkLst>
+      </pc:sldChg>
+      <pc:sldChg chg="del">
+        <pc:chgData name="Irving Birkner" userId="3ca2f16b-06b2-436b-9a83-674815ebc501" providerId="ADAL" clId="{1814AE70-A00B-41A8-95BC-13975D88D3B5}" dt="2023-07-13T22:10:37.815" v="1380" actId="47"/>
+        <pc:sldMkLst>
+          <pc:docMk/>
+          <pc:sldMk cId="532770432" sldId="319"/>
+        </pc:sldMkLst>
+      </pc:sldChg>
+      <pc:sldChg chg="del">
+        <pc:chgData name="Irving Birkner" userId="3ca2f16b-06b2-436b-9a83-674815ebc501" providerId="ADAL" clId="{1814AE70-A00B-41A8-95BC-13975D88D3B5}" dt="2023-07-13T22:10:37.815" v="1380" actId="47"/>
+        <pc:sldMkLst>
+          <pc:docMk/>
+          <pc:sldMk cId="2563544280" sldId="320"/>
+        </pc:sldMkLst>
+      </pc:sldChg>
+      <pc:sldChg chg="del">
+        <pc:chgData name="Irving Birkner" userId="3ca2f16b-06b2-436b-9a83-674815ebc501" providerId="ADAL" clId="{1814AE70-A00B-41A8-95BC-13975D88D3B5}" dt="2023-07-13T22:10:37.815" v="1380" actId="47"/>
+        <pc:sldMkLst>
+          <pc:docMk/>
+          <pc:sldMk cId="2986560975" sldId="321"/>
+        </pc:sldMkLst>
+      </pc:sldChg>
+      <pc:sldChg chg="del">
+        <pc:chgData name="Irving Birkner" userId="3ca2f16b-06b2-436b-9a83-674815ebc501" providerId="ADAL" clId="{1814AE70-A00B-41A8-95BC-13975D88D3B5}" dt="2023-07-13T22:10:37.815" v="1380" actId="47"/>
+        <pc:sldMkLst>
+          <pc:docMk/>
+          <pc:sldMk cId="4046613230" sldId="322"/>
+        </pc:sldMkLst>
+      </pc:sldChg>
+      <pc:sldChg chg="del">
+        <pc:chgData name="Irving Birkner" userId="3ca2f16b-06b2-436b-9a83-674815ebc501" providerId="ADAL" clId="{1814AE70-A00B-41A8-95BC-13975D88D3B5}" dt="2023-07-13T22:10:37.815" v="1380" actId="47"/>
+        <pc:sldMkLst>
+          <pc:docMk/>
+          <pc:sldMk cId="1587014248" sldId="325"/>
+        </pc:sldMkLst>
+      </pc:sldChg>
+      <pc:sldChg chg="ord">
+        <pc:chgData name="Irving Birkner" userId="3ca2f16b-06b2-436b-9a83-674815ebc501" providerId="ADAL" clId="{1814AE70-A00B-41A8-95BC-13975D88D3B5}" dt="2023-07-13T22:10:24.370" v="1379"/>
+        <pc:sldMkLst>
+          <pc:docMk/>
+          <pc:sldMk cId="544058657" sldId="338"/>
+        </pc:sldMkLst>
+      </pc:sldChg>
+      <pc:sldChg chg="del">
+        <pc:chgData name="Irving Birkner" userId="3ca2f16b-06b2-436b-9a83-674815ebc501" providerId="ADAL" clId="{1814AE70-A00B-41A8-95BC-13975D88D3B5}" dt="2023-07-13T22:21:12.681" v="1613" actId="47"/>
+        <pc:sldMkLst>
+          <pc:docMk/>
+          <pc:sldMk cId="3210127551" sldId="339"/>
+        </pc:sldMkLst>
+      </pc:sldChg>
+      <pc:sldChg chg="del">
+        <pc:chgData name="Irving Birkner" userId="3ca2f16b-06b2-436b-9a83-674815ebc501" providerId="ADAL" clId="{1814AE70-A00B-41A8-95BC-13975D88D3B5}" dt="2023-07-13T19:17:04.109" v="0" actId="2696"/>
+        <pc:sldMkLst>
+          <pc:docMk/>
+          <pc:sldMk cId="1668184574" sldId="341"/>
+        </pc:sldMkLst>
+      </pc:sldChg>
+      <pc:sldChg chg="addSp delSp modSp mod modNotesTx">
+        <pc:chgData name="Irving Birkner" userId="3ca2f16b-06b2-436b-9a83-674815ebc501" providerId="ADAL" clId="{1814AE70-A00B-41A8-95BC-13975D88D3B5}" dt="2023-07-13T20:00:46.161" v="823"/>
+        <pc:sldMkLst>
+          <pc:docMk/>
+          <pc:sldMk cId="382021659" sldId="342"/>
+        </pc:sldMkLst>
+        <pc:picChg chg="del">
+          <ac:chgData name="Irving Birkner" userId="3ca2f16b-06b2-436b-9a83-674815ebc501" providerId="ADAL" clId="{1814AE70-A00B-41A8-95BC-13975D88D3B5}" dt="2023-07-13T19:44:02.149" v="20" actId="478"/>
+          <ac:picMkLst>
+            <pc:docMk/>
+            <pc:sldMk cId="382021659" sldId="342"/>
+            <ac:picMk id="3" creationId="{49FA1C50-EA49-A5AC-0523-5FD7CE5E68AF}"/>
+          </ac:picMkLst>
+        </pc:picChg>
+        <pc:picChg chg="add mod modCrop">
+          <ac:chgData name="Irving Birkner" userId="3ca2f16b-06b2-436b-9a83-674815ebc501" providerId="ADAL" clId="{1814AE70-A00B-41A8-95BC-13975D88D3B5}" dt="2023-07-13T19:54:13.346" v="688" actId="732"/>
+          <ac:picMkLst>
+            <pc:docMk/>
+            <pc:sldMk cId="382021659" sldId="342"/>
+            <ac:picMk id="4" creationId="{DD75B20D-BA3E-4A1B-BEA5-E96460BBEF97}"/>
+          </ac:picMkLst>
+        </pc:picChg>
+      </pc:sldChg>
+      <pc:sldChg chg="del">
+        <pc:chgData name="Irving Birkner" userId="3ca2f16b-06b2-436b-9a83-674815ebc501" providerId="ADAL" clId="{1814AE70-A00B-41A8-95BC-13975D88D3B5}" dt="2023-07-13T19:23:08.809" v="19" actId="2696"/>
+        <pc:sldMkLst>
+          <pc:docMk/>
+          <pc:sldMk cId="2954882178" sldId="344"/>
+        </pc:sldMkLst>
+      </pc:sldChg>
+      <pc:sldChg chg="ord modNotesTx">
+        <pc:chgData name="Irving Birkner" userId="3ca2f16b-06b2-436b-9a83-674815ebc501" providerId="ADAL" clId="{1814AE70-A00B-41A8-95BC-13975D88D3B5}" dt="2023-07-13T22:09:53.482" v="1377" actId="20577"/>
+        <pc:sldMkLst>
+          <pc:docMk/>
+          <pc:sldMk cId="2681098044" sldId="345"/>
+        </pc:sldMkLst>
+      </pc:sldChg>
+      <pc:sldChg chg="del">
+        <pc:chgData name="Irving Birkner" userId="3ca2f16b-06b2-436b-9a83-674815ebc501" providerId="ADAL" clId="{1814AE70-A00B-41A8-95BC-13975D88D3B5}" dt="2023-07-13T20:29:43.102" v="1105" actId="47"/>
+        <pc:sldMkLst>
+          <pc:docMk/>
+          <pc:sldMk cId="1631487348" sldId="346"/>
+        </pc:sldMkLst>
+      </pc:sldChg>
+      <pc:sldChg chg="addSp delSp modSp mod modNotesTx">
+        <pc:chgData name="Irving Birkner" userId="3ca2f16b-06b2-436b-9a83-674815ebc501" providerId="ADAL" clId="{1814AE70-A00B-41A8-95BC-13975D88D3B5}" dt="2023-07-13T20:29:15.979" v="1100" actId="20577"/>
+        <pc:sldMkLst>
+          <pc:docMk/>
+          <pc:sldMk cId="1790047042" sldId="347"/>
+        </pc:sldMkLst>
+        <pc:spChg chg="del mod">
+          <ac:chgData name="Irving Birkner" userId="3ca2f16b-06b2-436b-9a83-674815ebc501" providerId="ADAL" clId="{1814AE70-A00B-41A8-95BC-13975D88D3B5}" dt="2023-07-13T20:27:33.648" v="1009" actId="478"/>
+          <ac:spMkLst>
+            <pc:docMk/>
+            <pc:sldMk cId="1790047042" sldId="347"/>
+            <ac:spMk id="6" creationId="{232CB0DA-7365-F64F-29A1-FBDD839E7C80}"/>
+          </ac:spMkLst>
+        </pc:spChg>
+        <pc:spChg chg="mod">
+          <ac:chgData name="Irving Birkner" userId="3ca2f16b-06b2-436b-9a83-674815ebc501" providerId="ADAL" clId="{1814AE70-A00B-41A8-95BC-13975D88D3B5}" dt="2023-07-13T20:21:07.945" v="863" actId="20577"/>
+          <ac:spMkLst>
+            <pc:docMk/>
+            <pc:sldMk cId="1790047042" sldId="347"/>
+            <ac:spMk id="287" creationId="{00000000-0000-0000-0000-000000000000}"/>
+          </ac:spMkLst>
+        </pc:spChg>
+        <pc:graphicFrameChg chg="add mod modGraphic">
+          <ac:chgData name="Irving Birkner" userId="3ca2f16b-06b2-436b-9a83-674815ebc501" providerId="ADAL" clId="{1814AE70-A00B-41A8-95BC-13975D88D3B5}" dt="2023-07-13T20:27:20.934" v="1008" actId="20577"/>
+          <ac:graphicFrameMkLst>
+            <pc:docMk/>
+            <pc:sldMk cId="1790047042" sldId="347"/>
+            <ac:graphicFrameMk id="2" creationId="{782AFF68-1FA7-5A8B-52B1-8C6606C55CFF}"/>
+          </ac:graphicFrameMkLst>
+        </pc:graphicFrameChg>
+        <pc:picChg chg="del">
+          <ac:chgData name="Irving Birkner" userId="3ca2f16b-06b2-436b-9a83-674815ebc501" providerId="ADAL" clId="{1814AE70-A00B-41A8-95BC-13975D88D3B5}" dt="2023-07-13T20:21:17.546" v="864" actId="478"/>
+          <ac:picMkLst>
+            <pc:docMk/>
+            <pc:sldMk cId="1790047042" sldId="347"/>
+            <ac:picMk id="4" creationId="{89B7216F-C179-BD91-9676-D460174EF296}"/>
+          </ac:picMkLst>
+        </pc:picChg>
+      </pc:sldChg>
+      <pc:sldChg chg="del">
+        <pc:chgData name="Irving Birkner" userId="3ca2f16b-06b2-436b-9a83-674815ebc501" providerId="ADAL" clId="{1814AE70-A00B-41A8-95BC-13975D88D3B5}" dt="2023-07-13T20:29:43.102" v="1105" actId="47"/>
+        <pc:sldMkLst>
+          <pc:docMk/>
+          <pc:sldMk cId="4059683777" sldId="348"/>
+        </pc:sldMkLst>
+      </pc:sldChg>
+      <pc:sldChg chg="del">
+        <pc:chgData name="Irving Birkner" userId="3ca2f16b-06b2-436b-9a83-674815ebc501" providerId="ADAL" clId="{1814AE70-A00B-41A8-95BC-13975D88D3B5}" dt="2023-07-13T20:28:49.494" v="1099" actId="47"/>
+        <pc:sldMkLst>
+          <pc:docMk/>
+          <pc:sldMk cId="1606485367" sldId="349"/>
+        </pc:sldMkLst>
+      </pc:sldChg>
+      <pc:sldChg chg="del">
+        <pc:chgData name="Irving Birkner" userId="3ca2f16b-06b2-436b-9a83-674815ebc501" providerId="ADAL" clId="{1814AE70-A00B-41A8-95BC-13975D88D3B5}" dt="2023-07-13T20:28:49.494" v="1099" actId="47"/>
+        <pc:sldMkLst>
+          <pc:docMk/>
+          <pc:sldMk cId="1165116582" sldId="352"/>
+        </pc:sldMkLst>
+      </pc:sldChg>
+      <pc:sldChg chg="del">
+        <pc:chgData name="Irving Birkner" userId="3ca2f16b-06b2-436b-9a83-674815ebc501" providerId="ADAL" clId="{1814AE70-A00B-41A8-95BC-13975D88D3B5}" dt="2023-07-13T20:28:49.494" v="1099" actId="47"/>
+        <pc:sldMkLst>
+          <pc:docMk/>
+          <pc:sldMk cId="987929229" sldId="353"/>
+        </pc:sldMkLst>
+      </pc:sldChg>
+      <pc:sldChg chg="addSp delSp modSp add mod ord modNotesTx">
+        <pc:chgData name="Irving Birkner" userId="3ca2f16b-06b2-436b-9a83-674815ebc501" providerId="ADAL" clId="{1814AE70-A00B-41A8-95BC-13975D88D3B5}" dt="2023-07-13T22:09:42.229" v="1376" actId="20577"/>
+        <pc:sldMkLst>
+          <pc:docMk/>
+          <pc:sldMk cId="1060599179" sldId="357"/>
+        </pc:sldMkLst>
+        <pc:spChg chg="del mod">
+          <ac:chgData name="Irving Birkner" userId="3ca2f16b-06b2-436b-9a83-674815ebc501" providerId="ADAL" clId="{1814AE70-A00B-41A8-95BC-13975D88D3B5}" dt="2023-07-13T19:20:04.782" v="9" actId="478"/>
+          <ac:spMkLst>
+            <pc:docMk/>
+            <pc:sldMk cId="1060599179" sldId="357"/>
+            <ac:spMk id="3" creationId="{EC9AA3F7-FC6E-575A-F3F6-82A49486401E}"/>
+          </ac:spMkLst>
+        </pc:spChg>
+        <pc:spChg chg="add mod">
+          <ac:chgData name="Irving Birkner" userId="3ca2f16b-06b2-436b-9a83-674815ebc501" providerId="ADAL" clId="{1814AE70-A00B-41A8-95BC-13975D88D3B5}" dt="2023-07-13T19:20:04.782" v="9" actId="478"/>
+          <ac:spMkLst>
+            <pc:docMk/>
+            <pc:sldMk cId="1060599179" sldId="357"/>
+            <ac:spMk id="5" creationId="{D2AAA14F-44ED-838C-2D97-D0CBC8A1FD1B}"/>
+          </ac:spMkLst>
+        </pc:spChg>
+        <pc:spChg chg="add mod">
+          <ac:chgData name="Irving Birkner" userId="3ca2f16b-06b2-436b-9a83-674815ebc501" providerId="ADAL" clId="{1814AE70-A00B-41A8-95BC-13975D88D3B5}" dt="2023-07-13T19:20:29.160" v="11" actId="207"/>
+          <ac:spMkLst>
+            <pc:docMk/>
+            <pc:sldMk cId="1060599179" sldId="357"/>
+            <ac:spMk id="6" creationId="{9CE132C3-49EA-2E47-A337-01679FF02C30}"/>
+          </ac:spMkLst>
+        </pc:spChg>
+      </pc:sldChg>
+      <pc:sldChg chg="add">
+        <pc:chgData name="Irving Birkner" userId="3ca2f16b-06b2-436b-9a83-674815ebc501" providerId="ADAL" clId="{1814AE70-A00B-41A8-95BC-13975D88D3B5}" dt="2023-07-13T20:01:50.641" v="824" actId="2890"/>
+        <pc:sldMkLst>
+          <pc:docMk/>
+          <pc:sldMk cId="1174394797" sldId="358"/>
+        </pc:sldMkLst>
+      </pc:sldChg>
+      <pc:sldChg chg="delSp modSp add mod ord modNotesTx">
+        <pc:chgData name="Irving Birkner" userId="3ca2f16b-06b2-436b-9a83-674815ebc501" providerId="ADAL" clId="{1814AE70-A00B-41A8-95BC-13975D88D3B5}" dt="2023-07-13T22:21:07.242" v="1612" actId="20577"/>
+        <pc:sldMkLst>
+          <pc:docMk/>
+          <pc:sldMk cId="2639607011" sldId="360"/>
+        </pc:sldMkLst>
+        <pc:spChg chg="mod">
+          <ac:chgData name="Irving Birkner" userId="3ca2f16b-06b2-436b-9a83-674815ebc501" providerId="ADAL" clId="{1814AE70-A00B-41A8-95BC-13975D88D3B5}" dt="2023-07-13T22:20:31.196" v="1590" actId="20577"/>
+          <ac:spMkLst>
+            <pc:docMk/>
+            <pc:sldMk cId="2639607011" sldId="360"/>
+            <ac:spMk id="2" creationId="{D8FE4A10-593E-C3E4-8568-22199311CB20}"/>
+          </ac:spMkLst>
+        </pc:spChg>
+        <pc:spChg chg="mod">
+          <ac:chgData name="Irving Birkner" userId="3ca2f16b-06b2-436b-9a83-674815ebc501" providerId="ADAL" clId="{1814AE70-A00B-41A8-95BC-13975D88D3B5}" dt="2023-07-13T22:21:07.242" v="1612" actId="20577"/>
+          <ac:spMkLst>
+            <pc:docMk/>
+            <pc:sldMk cId="2639607011" sldId="360"/>
+            <ac:spMk id="287" creationId="{00000000-0000-0000-0000-000000000000}"/>
+          </ac:spMkLst>
+        </pc:spChg>
+        <pc:picChg chg="del">
+          <ac:chgData name="Irving Birkner" userId="3ca2f16b-06b2-436b-9a83-674815ebc501" providerId="ADAL" clId="{1814AE70-A00B-41A8-95BC-13975D88D3B5}" dt="2023-07-13T22:18:38.452" v="1426" actId="478"/>
+          <ac:picMkLst>
+            <pc:docMk/>
+            <pc:sldMk cId="2639607011" sldId="360"/>
+            <ac:picMk id="4" creationId="{1C7F3501-D10D-4365-EAEF-B4BC43E9468E}"/>
+          </ac:picMkLst>
+        </pc:picChg>
+      </pc:sldChg>
+      <pc:sldChg chg="modSp add mod ord">
+        <pc:chgData name="Irving Birkner" userId="3ca2f16b-06b2-436b-9a83-674815ebc501" providerId="ADAL" clId="{1814AE70-A00B-41A8-95BC-13975D88D3B5}" dt="2023-07-13T22:21:44.344" v="1646" actId="20577"/>
+        <pc:sldMkLst>
+          <pc:docMk/>
+          <pc:sldMk cId="3338026029" sldId="362"/>
+        </pc:sldMkLst>
+        <pc:spChg chg="mod">
+          <ac:chgData name="Irving Birkner" userId="3ca2f16b-06b2-436b-9a83-674815ebc501" providerId="ADAL" clId="{1814AE70-A00B-41A8-95BC-13975D88D3B5}" dt="2023-07-13T22:21:44.344" v="1646" actId="20577"/>
+          <ac:spMkLst>
+            <pc:docMk/>
+            <pc:sldMk cId="3338026029" sldId="362"/>
+            <ac:spMk id="3" creationId="{EC9AA3F7-FC6E-575A-F3F6-82A49486401E}"/>
+          </ac:spMkLst>
+        </pc:spChg>
+      </pc:sldChg>
+      <pc:sldMasterChg chg="delSldLayout">
+        <pc:chgData name="Irving Birkner" userId="3ca2f16b-06b2-436b-9a83-674815ebc501" providerId="ADAL" clId="{1814AE70-A00B-41A8-95BC-13975D88D3B5}" dt="2023-07-13T22:10:37.815" v="1380" actId="47"/>
+        <pc:sldMasterMkLst>
+          <pc:docMk/>
+          <pc:sldMasterMk cId="3033157277" sldId="2147483687"/>
+        </pc:sldMasterMkLst>
+        <pc:sldLayoutChg chg="del">
+          <pc:chgData name="Irving Birkner" userId="3ca2f16b-06b2-436b-9a83-674815ebc501" providerId="ADAL" clId="{1814AE70-A00B-41A8-95BC-13975D88D3B5}" dt="2023-07-13T22:10:37.815" v="1380" actId="47"/>
+          <pc:sldLayoutMkLst>
+            <pc:docMk/>
+            <pc:sldMasterMk cId="3033157277" sldId="2147483687"/>
+            <pc:sldLayoutMk cId="2391683861" sldId="2147483699"/>
+          </pc:sldLayoutMkLst>
+        </pc:sldLayoutChg>
+      </pc:sldMasterChg>
     </pc:docChg>
   </pc:docChgLst>
   <pc:docChgLst>
@@ -32715,7 +32715,7 @@
         <p:spPr>
           <a:xfrm>
             <a:off x="322730" y="1533343"/>
-            <a:ext cx="8498539" cy="3847207"/>
+            <a:ext cx="8498539" cy="4401205"/>
           </a:xfrm>
           <a:prstGeom prst="rect">
             <a:avLst/>
@@ -32733,14 +32733,14 @@
               <a:buChar char="•"/>
             </a:pPr>
             <a:r>
-              <a:rPr lang="en-US">
+              <a:rPr lang="en-US" dirty="0">
                 <a:cs typeface="Calibri"/>
               </a:rPr>
               <a:t>Web interface, SAS Studio good for exploring, but not your research work</a:t>
             </a:r>
           </a:p>
           <a:p>
-            <a:endParaRPr lang="en-US">
+            <a:endParaRPr lang="en-US" dirty="0">
               <a:cs typeface="Calibri"/>
             </a:endParaRPr>
           </a:p>
@@ -32750,14 +32750,14 @@
               <a:buChar char="•"/>
             </a:pPr>
             <a:r>
-              <a:rPr lang="en-US">
+              <a:rPr lang="en-US" dirty="0">
                 <a:cs typeface="Calibri"/>
               </a:rPr>
               <a:t>Use KLC to gather, store the data you need</a:t>
             </a:r>
           </a:p>
           <a:p>
-            <a:endParaRPr lang="en-US">
+            <a:endParaRPr lang="en-US" dirty="0">
               <a:cs typeface="Calibri"/>
             </a:endParaRPr>
           </a:p>
@@ -32767,14 +32767,14 @@
               <a:buChar char="•"/>
             </a:pPr>
             <a:r>
-              <a:rPr lang="en-US">
+              <a:rPr lang="en-US" dirty="0">
                 <a:cs typeface="Calibri"/>
               </a:rPr>
               <a:t>Keep snapshots of raw data, which occasionally changes</a:t>
             </a:r>
           </a:p>
           <a:p>
-            <a:endParaRPr lang="en-US">
+            <a:endParaRPr lang="en-US" dirty="0">
               <a:cs typeface="Calibri"/>
             </a:endParaRPr>
           </a:p>
@@ -32784,18 +32784,20 @@
               <a:buChar char="•"/>
             </a:pPr>
             <a:r>
+              <a:rPr lang="en-US" dirty="0">
+                <a:cs typeface="Calibri"/>
+              </a:rPr>
+              <a:t>Gather large data pulls in </a:t>
+            </a:r>
+            <a:r>
               <a:rPr lang="en-US">
                 <a:cs typeface="Calibri"/>
               </a:rPr>
-              <a:t>Gather large data pulls in modular chunks</a:t>
+              <a:t>modular chunks</a:t>
             </a:r>
           </a:p>
           <a:p>
-            <a:pPr marL="285750" indent="-285750">
-              <a:buFont typeface="Arial"/>
-              <a:buChar char="•"/>
-            </a:pPr>
-            <a:endParaRPr lang="en-US">
+            <a:endParaRPr lang="en-US" dirty="0">
               <a:cs typeface="Calibri"/>
             </a:endParaRPr>
           </a:p>
@@ -32805,15 +32807,18 @@
               <a:buChar char="•"/>
             </a:pPr>
             <a:r>
-              <a:rPr lang="en-US">
+              <a:rPr lang="en-US" b="1" dirty="0">
                 <a:cs typeface="Calibri"/>
               </a:rPr>
-              <a:t>Abstract data gathering from other steps</a:t>
+              <a:t>DO NOT EVER OVERWRITE RAW DATA</a:t>
             </a:r>
-            <a:endParaRPr lang="en-US"/>
           </a:p>
           <a:p>
-            <a:endParaRPr lang="en-US">
+            <a:pPr marL="285750" indent="-285750">
+              <a:buFont typeface="Arial"/>
+              <a:buChar char="•"/>
+            </a:pPr>
+            <a:endParaRPr lang="en-US" dirty="0">
               <a:cs typeface="Calibri"/>
             </a:endParaRPr>
           </a:p>
@@ -32823,7 +32828,25 @@
               <a:buChar char="•"/>
             </a:pPr>
             <a:r>
-              <a:rPr lang="en-US">
+              <a:rPr lang="en-US" dirty="0">
+                <a:cs typeface="Calibri"/>
+              </a:rPr>
+              <a:t>Abstract data gathering from other steps</a:t>
+            </a:r>
+            <a:endParaRPr lang="en-US" dirty="0"/>
+          </a:p>
+          <a:p>
+            <a:endParaRPr lang="en-US" dirty="0">
+              <a:cs typeface="Calibri"/>
+            </a:endParaRPr>
+          </a:p>
+          <a:p>
+            <a:pPr marL="285750" indent="-285750">
+              <a:buFont typeface="Arial"/>
+              <a:buChar char="•"/>
+            </a:pPr>
+            <a:r>
+              <a:rPr lang="en-US" dirty="0">
                 <a:cs typeface="Calibri"/>
               </a:rPr>
               <a:t>Understand your license privileges</a:t>
@@ -32837,12 +32860,12 @@
               <a:buFont typeface="Arial"/>
               <a:buChar char="•"/>
             </a:pPr>
-            <a:endParaRPr lang="en-US">
+            <a:endParaRPr lang="en-US" dirty="0">
               <a:cs typeface="Calibri"/>
             </a:endParaRPr>
           </a:p>
           <a:p>
-            <a:endParaRPr lang="en-US">
+            <a:endParaRPr lang="en-US" dirty="0">
               <a:cs typeface="Arial"/>
             </a:endParaRPr>
           </a:p>

</xml_diff>